<commit_message>
minor changes after workshop
</commit_message>
<xml_diff>
--- a/Day4.pptx
+++ b/Day4.pptx
@@ -1739,7 +1739,7 @@
           <a:p>
             <a:fld id="{3B691ABC-A100-4C17-BF44-47B91CE9CCB3}" type="datetimeFigureOut">
               <a:rPr lang="en-US" smtClean="0"/>
-              <a:t>2/23/2023</a:t>
+              <a:t>2/24/2023</a:t>
             </a:fld>
             <a:endParaRPr lang="en-US"/>
           </a:p>
@@ -1923,7 +1923,7 @@
           <a:p>
             <a:fld id="{D3F2CA2A-B6AE-4222-8A00-A0E4B2FB2BE0}" type="datetimeFigureOut">
               <a:rPr lang="en-US" smtClean="0"/>
-              <a:t>2/23/2023</a:t>
+              <a:t>2/24/2023</a:t>
             </a:fld>
             <a:endParaRPr lang="en-US"/>
           </a:p>
@@ -2942,7 +2942,7 @@
           <a:p>
             <a:fld id="{116BF4AA-EB3B-4996-9F03-E041CE51D2F0}" type="datetimeFigureOut">
               <a:rPr lang="en-US" smtClean="0"/>
-              <a:t>2/23/2023</a:t>
+              <a:t>2/24/2023</a:t>
             </a:fld>
             <a:endParaRPr lang="en-US" dirty="0"/>
           </a:p>
@@ -26521,21 +26521,6 @@
 </file>
 
 <file path=customXml/item1.xml><?xml version="1.0" encoding="utf-8"?>
-<?mso-contentType ?>
-<FormTemplates xmlns="http://schemas.microsoft.com/sharepoint/v3/contenttype/forms">
-  <Display>DocumentLibraryForm</Display>
-  <Edit>DocumentLibraryForm</Edit>
-  <New>DocumentLibraryForm</New>
-</FormTemplates>
-</file>
-
-<file path=customXml/item2.xml><?xml version="1.0" encoding="utf-8"?>
-<p:properties xmlns:p="http://schemas.microsoft.com/office/2006/metadata/properties" xmlns:xsi="http://www.w3.org/2001/XMLSchema-instance" xmlns:pc="http://schemas.microsoft.com/office/infopath/2007/PartnerControls">
-  <documentManagement/>
-</p:properties>
-</file>
-
-<file path=customXml/item3.xml><?xml version="1.0" encoding="utf-8"?>
 <ct:contentTypeSchema xmlns:ct="http://schemas.microsoft.com/office/2006/metadata/contentType" xmlns:ma="http://schemas.microsoft.com/office/2006/metadata/properties/metaAttributes" ct:_="" ma:_="" ma:contentTypeName="Document" ma:contentTypeID="0x010100EBD1DD32686CE24489424A9170307366" ma:contentTypeVersion="15" ma:contentTypeDescription="Create a new document." ma:contentTypeScope="" ma:versionID="13d377b174b2f529824765938dc2d5b0">
   <xsd:schema xmlns:xsd="http://www.w3.org/2001/XMLSchema" xmlns:xs="http://www.w3.org/2001/XMLSchema" xmlns:p="http://schemas.microsoft.com/office/2006/metadata/properties" xmlns:ns3="81e6d9a0-d199-4fc7-a2c1-6ec51debf725" xmlns:ns4="3512e15b-87ae-4a53-9243-959a2a020a94" targetNamespace="http://schemas.microsoft.com/office/2006/metadata/properties" ma:root="true" ma:fieldsID="5fdaa99288c0db04a9ff91cf3a2a6373" ns3:_="" ns4:_="">
     <xsd:import namespace="81e6d9a0-d199-4fc7-a2c1-6ec51debf725"/>
@@ -26772,32 +26757,22 @@
 </ct:contentTypeSchema>
 </file>
 
-<file path=customXml/itemProps1.xml><?xml version="1.0" encoding="utf-8"?>
-<ds:datastoreItem xmlns:ds="http://schemas.openxmlformats.org/officeDocument/2006/customXml" ds:itemID="{C3EF72F5-14D2-47CD-80C7-998C7FE56B5F}">
-  <ds:schemaRefs>
-    <ds:schemaRef ds:uri="http://schemas.microsoft.com/sharepoint/v3/contenttype/forms"/>
-  </ds:schemaRefs>
-</ds:datastoreItem>
+<file path=customXml/item2.xml><?xml version="1.0" encoding="utf-8"?>
+<?mso-contentType ?>
+<FormTemplates xmlns="http://schemas.microsoft.com/sharepoint/v3/contenttype/forms">
+  <Display>DocumentLibraryForm</Display>
+  <Edit>DocumentLibraryForm</Edit>
+  <New>DocumentLibraryForm</New>
+</FormTemplates>
 </file>
 
-<file path=customXml/itemProps2.xml><?xml version="1.0" encoding="utf-8"?>
-<ds:datastoreItem xmlns:ds="http://schemas.openxmlformats.org/officeDocument/2006/customXml" ds:itemID="{D672241D-D14A-4F17-BD50-070FD8D31716}">
-  <ds:schemaRefs>
-    <ds:schemaRef ds:uri="http://purl.org/dc/elements/1.1/"/>
-    <ds:schemaRef ds:uri="http://www.w3.org/XML/1998/namespace"/>
-    <ds:schemaRef ds:uri="http://schemas.microsoft.com/office/2006/documentManagement/types"/>
-    <ds:schemaRef ds:uri="http://schemas.microsoft.com/office/infopath/2007/PartnerControls"/>
-    <ds:schemaRef ds:uri="81e6d9a0-d199-4fc7-a2c1-6ec51debf725"/>
-    <ds:schemaRef ds:uri="http://schemas.openxmlformats.org/package/2006/metadata/core-properties"/>
-    <ds:schemaRef ds:uri="3512e15b-87ae-4a53-9243-959a2a020a94"/>
-    <ds:schemaRef ds:uri="http://schemas.microsoft.com/office/2006/metadata/properties"/>
-    <ds:schemaRef ds:uri="http://purl.org/dc/dcmitype/"/>
-    <ds:schemaRef ds:uri="http://purl.org/dc/terms/"/>
-  </ds:schemaRefs>
-</ds:datastoreItem>
+<file path=customXml/item3.xml><?xml version="1.0" encoding="utf-8"?>
+<p:properties xmlns:p="http://schemas.microsoft.com/office/2006/metadata/properties" xmlns:xsi="http://www.w3.org/2001/XMLSchema-instance" xmlns:pc="http://schemas.microsoft.com/office/infopath/2007/PartnerControls">
+  <documentManagement/>
+</p:properties>
 </file>
 
-<file path=customXml/itemProps3.xml><?xml version="1.0" encoding="utf-8"?>
+<file path=customXml/itemProps1.xml><?xml version="1.0" encoding="utf-8"?>
 <ds:datastoreItem xmlns:ds="http://schemas.openxmlformats.org/officeDocument/2006/customXml" ds:itemID="{78183D06-9442-4C51-8F5D-52253A080FC6}">
   <ds:schemaRefs>
     <ds:schemaRef ds:uri="http://schemas.microsoft.com/office/2006/metadata/contentType"/>
@@ -26814,4 +26789,29 @@
     <ds:schemaRef ds:uri="http://schemas.microsoft.com/internal/obd"/>
   </ds:schemaRefs>
 </ds:datastoreItem>
+</file>
+
+<file path=customXml/itemProps2.xml><?xml version="1.0" encoding="utf-8"?>
+<ds:datastoreItem xmlns:ds="http://schemas.openxmlformats.org/officeDocument/2006/customXml" ds:itemID="{C3EF72F5-14D2-47CD-80C7-998C7FE56B5F}">
+  <ds:schemaRefs>
+    <ds:schemaRef ds:uri="http://schemas.microsoft.com/sharepoint/v3/contenttype/forms"/>
+  </ds:schemaRefs>
+</ds:datastoreItem>
+</file>
+
+<file path=customXml/itemProps3.xml><?xml version="1.0" encoding="utf-8"?>
+<ds:datastoreItem xmlns:ds="http://schemas.openxmlformats.org/officeDocument/2006/customXml" ds:itemID="{D672241D-D14A-4F17-BD50-070FD8D31716}">
+  <ds:schemaRefs>
+    <ds:schemaRef ds:uri="http://purl.org/dc/elements/1.1/"/>
+    <ds:schemaRef ds:uri="http://www.w3.org/XML/1998/namespace"/>
+    <ds:schemaRef ds:uri="http://schemas.microsoft.com/office/2006/documentManagement/types"/>
+    <ds:schemaRef ds:uri="http://schemas.microsoft.com/office/infopath/2007/PartnerControls"/>
+    <ds:schemaRef ds:uri="81e6d9a0-d199-4fc7-a2c1-6ec51debf725"/>
+    <ds:schemaRef ds:uri="http://schemas.openxmlformats.org/package/2006/metadata/core-properties"/>
+    <ds:schemaRef ds:uri="3512e15b-87ae-4a53-9243-959a2a020a94"/>
+    <ds:schemaRef ds:uri="http://schemas.microsoft.com/office/2006/metadata/properties"/>
+    <ds:schemaRef ds:uri="http://purl.org/dc/dcmitype/"/>
+    <ds:schemaRef ds:uri="http://purl.org/dc/terms/"/>
+  </ds:schemaRefs>
+</ds:datastoreItem>
 </file>
</xml_diff>